<commit_message>
adjust links to data
</commit_message>
<xml_diff>
--- a/11.7.22 Week 10 Day 1 Principal Component Analysis.pptx
+++ b/11.7.22 Week 10 Day 1 Principal Component Analysis.pptx
@@ -4387,7 +4387,7 @@
         <p:fade/>
       </p:transition>
     </mc:Choice>
-    <mc:Fallback xmlns:ahyp="http://schemas.microsoft.com/office/drawing/2018/hyperlinkcolor" xmlns:p15="http://schemas.microsoft.com/office/powerpoint/2012/main" xmlns:com="http://schemas.openxmlformats.org/drawingml/2006/compatibility" xmlns:pvml="urn:schemas-microsoft-com:office:powerpoint" xmlns:v="urn:schemas-microsoft-com:vml" xmlns:o="urn:schemas-microsoft-com:office:office" xmlns:dgm="http://schemas.openxmlformats.org/drawingml/2006/diagram" xmlns:c="http://schemas.openxmlformats.org/drawingml/2006/chart" xmlns:mv="urn:schemas-microsoft-com:mac:vml" xmlns="">
+    <mc:Fallback xmlns="" xmlns:mv="urn:schemas-microsoft-com:mac:vml" xmlns:c="http://schemas.openxmlformats.org/drawingml/2006/chart" xmlns:dgm="http://schemas.openxmlformats.org/drawingml/2006/diagram" xmlns:o="urn:schemas-microsoft-com:office:office" xmlns:v="urn:schemas-microsoft-com:vml" xmlns:pvml="urn:schemas-microsoft-com:office:powerpoint" xmlns:com="http://schemas.openxmlformats.org/drawingml/2006/compatibility" xmlns:p15="http://schemas.microsoft.com/office/powerpoint/2012/main" xmlns:ahyp="http://schemas.microsoft.com/office/drawing/2018/hyperlinkcolor">
       <p:transition spd="slow">
         <p:fade/>
       </p:transition>
@@ -4424,7 +4424,7 @@
         <p:fade/>
       </p:transition>
     </mc:Choice>
-    <mc:Fallback xmlns:ahyp="http://schemas.microsoft.com/office/drawing/2018/hyperlinkcolor" xmlns:p15="http://schemas.microsoft.com/office/powerpoint/2012/main" xmlns:com="http://schemas.openxmlformats.org/drawingml/2006/compatibility" xmlns:pvml="urn:schemas-microsoft-com:office:powerpoint" xmlns:v="urn:schemas-microsoft-com:vml" xmlns:o="urn:schemas-microsoft-com:office:office" xmlns:dgm="http://schemas.openxmlformats.org/drawingml/2006/diagram" xmlns:c="http://schemas.openxmlformats.org/drawingml/2006/chart" xmlns:mv="urn:schemas-microsoft-com:mac:vml" xmlns="">
+    <mc:Fallback xmlns="" xmlns:mv="urn:schemas-microsoft-com:mac:vml" xmlns:c="http://schemas.openxmlformats.org/drawingml/2006/chart" xmlns:dgm="http://schemas.openxmlformats.org/drawingml/2006/diagram" xmlns:o="urn:schemas-microsoft-com:office:office" xmlns:v="urn:schemas-microsoft-com:vml" xmlns:pvml="urn:schemas-microsoft-com:office:powerpoint" xmlns:com="http://schemas.openxmlformats.org/drawingml/2006/compatibility" xmlns:p15="http://schemas.microsoft.com/office/powerpoint/2012/main" xmlns:ahyp="http://schemas.microsoft.com/office/drawing/2018/hyperlinkcolor">
       <p:transition spd="slow">
         <p:fade/>
       </p:transition>
@@ -4461,7 +4461,7 @@
         <p:fade/>
       </p:transition>
     </mc:Choice>
-    <mc:Fallback xmlns:ahyp="http://schemas.microsoft.com/office/drawing/2018/hyperlinkcolor" xmlns:p15="http://schemas.microsoft.com/office/powerpoint/2012/main" xmlns:com="http://schemas.openxmlformats.org/drawingml/2006/compatibility" xmlns:pvml="urn:schemas-microsoft-com:office:powerpoint" xmlns:v="urn:schemas-microsoft-com:vml" xmlns:o="urn:schemas-microsoft-com:office:office" xmlns:dgm="http://schemas.openxmlformats.org/drawingml/2006/diagram" xmlns:c="http://schemas.openxmlformats.org/drawingml/2006/chart" xmlns:mv="urn:schemas-microsoft-com:mac:vml" xmlns="">
+    <mc:Fallback xmlns="" xmlns:mv="urn:schemas-microsoft-com:mac:vml" xmlns:c="http://schemas.openxmlformats.org/drawingml/2006/chart" xmlns:dgm="http://schemas.openxmlformats.org/drawingml/2006/diagram" xmlns:o="urn:schemas-microsoft-com:office:office" xmlns:v="urn:schemas-microsoft-com:vml" xmlns:pvml="urn:schemas-microsoft-com:office:powerpoint" xmlns:com="http://schemas.openxmlformats.org/drawingml/2006/compatibility" xmlns:p15="http://schemas.microsoft.com/office/powerpoint/2012/main" xmlns:ahyp="http://schemas.microsoft.com/office/drawing/2018/hyperlinkcolor">
       <p:transition spd="slow">
         <p:fade/>
       </p:transition>
@@ -4498,7 +4498,7 @@
         <p:fade/>
       </p:transition>
     </mc:Choice>
-    <mc:Fallback xmlns:ahyp="http://schemas.microsoft.com/office/drawing/2018/hyperlinkcolor" xmlns:p15="http://schemas.microsoft.com/office/powerpoint/2012/main" xmlns:com="http://schemas.openxmlformats.org/drawingml/2006/compatibility" xmlns:pvml="urn:schemas-microsoft-com:office:powerpoint" xmlns:v="urn:schemas-microsoft-com:vml" xmlns:o="urn:schemas-microsoft-com:office:office" xmlns:dgm="http://schemas.openxmlformats.org/drawingml/2006/diagram" xmlns:c="http://schemas.openxmlformats.org/drawingml/2006/chart" xmlns:mv="urn:schemas-microsoft-com:mac:vml" xmlns="">
+    <mc:Fallback xmlns="" xmlns:mv="urn:schemas-microsoft-com:mac:vml" xmlns:c="http://schemas.openxmlformats.org/drawingml/2006/chart" xmlns:dgm="http://schemas.openxmlformats.org/drawingml/2006/diagram" xmlns:o="urn:schemas-microsoft-com:office:office" xmlns:v="urn:schemas-microsoft-com:vml" xmlns:pvml="urn:schemas-microsoft-com:office:powerpoint" xmlns:com="http://schemas.openxmlformats.org/drawingml/2006/compatibility" xmlns:p15="http://schemas.microsoft.com/office/powerpoint/2012/main" xmlns:ahyp="http://schemas.microsoft.com/office/drawing/2018/hyperlinkcolor">
       <p:transition spd="slow">
         <p:fade/>
       </p:transition>
@@ -4535,7 +4535,7 @@
         <p:fade/>
       </p:transition>
     </mc:Choice>
-    <mc:Fallback xmlns:ahyp="http://schemas.microsoft.com/office/drawing/2018/hyperlinkcolor" xmlns:p15="http://schemas.microsoft.com/office/powerpoint/2012/main" xmlns:com="http://schemas.openxmlformats.org/drawingml/2006/compatibility" xmlns:pvml="urn:schemas-microsoft-com:office:powerpoint" xmlns:v="urn:schemas-microsoft-com:vml" xmlns:o="urn:schemas-microsoft-com:office:office" xmlns:dgm="http://schemas.openxmlformats.org/drawingml/2006/diagram" xmlns:c="http://schemas.openxmlformats.org/drawingml/2006/chart" xmlns:mv="urn:schemas-microsoft-com:mac:vml" xmlns="">
+    <mc:Fallback xmlns="" xmlns:mv="urn:schemas-microsoft-com:mac:vml" xmlns:c="http://schemas.openxmlformats.org/drawingml/2006/chart" xmlns:dgm="http://schemas.openxmlformats.org/drawingml/2006/diagram" xmlns:o="urn:schemas-microsoft-com:office:office" xmlns:v="urn:schemas-microsoft-com:vml" xmlns:pvml="urn:schemas-microsoft-com:office:powerpoint" xmlns:com="http://schemas.openxmlformats.org/drawingml/2006/compatibility" xmlns:p15="http://schemas.microsoft.com/office/powerpoint/2012/main" xmlns:ahyp="http://schemas.microsoft.com/office/drawing/2018/hyperlinkcolor">
       <p:transition spd="slow">
         <p:fade/>
       </p:transition>
@@ -6570,7 +6570,7 @@
         <p:fade/>
       </p:transition>
     </mc:Choice>
-    <mc:Fallback xmlns:ahyp="http://schemas.microsoft.com/office/drawing/2018/hyperlinkcolor" xmlns:p15="http://schemas.microsoft.com/office/powerpoint/2012/main" xmlns:com="http://schemas.openxmlformats.org/drawingml/2006/compatibility" xmlns:pvml="urn:schemas-microsoft-com:office:powerpoint" xmlns:v="urn:schemas-microsoft-com:vml" xmlns:o="urn:schemas-microsoft-com:office:office" xmlns:dgm="http://schemas.openxmlformats.org/drawingml/2006/diagram" xmlns:c="http://schemas.openxmlformats.org/drawingml/2006/chart" xmlns:mv="urn:schemas-microsoft-com:mac:vml" xmlns="">
+    <mc:Fallback xmlns="" xmlns:mv="urn:schemas-microsoft-com:mac:vml" xmlns:c="http://schemas.openxmlformats.org/drawingml/2006/chart" xmlns:dgm="http://schemas.openxmlformats.org/drawingml/2006/diagram" xmlns:o="urn:schemas-microsoft-com:office:office" xmlns:v="urn:schemas-microsoft-com:vml" xmlns:pvml="urn:schemas-microsoft-com:office:powerpoint" xmlns:com="http://schemas.openxmlformats.org/drawingml/2006/compatibility" xmlns:p15="http://schemas.microsoft.com/office/powerpoint/2012/main" xmlns:ahyp="http://schemas.microsoft.com/office/drawing/2018/hyperlinkcolor">
       <p:transition spd="slow">
         <p:fade/>
       </p:transition>
@@ -6607,7 +6607,7 @@
         <p:fade/>
       </p:transition>
     </mc:Choice>
-    <mc:Fallback xmlns:ahyp="http://schemas.microsoft.com/office/drawing/2018/hyperlinkcolor" xmlns:p15="http://schemas.microsoft.com/office/powerpoint/2012/main" xmlns:com="http://schemas.openxmlformats.org/drawingml/2006/compatibility" xmlns:pvml="urn:schemas-microsoft-com:office:powerpoint" xmlns:v="urn:schemas-microsoft-com:vml" xmlns:o="urn:schemas-microsoft-com:office:office" xmlns:dgm="http://schemas.openxmlformats.org/drawingml/2006/diagram" xmlns:c="http://schemas.openxmlformats.org/drawingml/2006/chart" xmlns:mv="urn:schemas-microsoft-com:mac:vml" xmlns="">
+    <mc:Fallback xmlns="" xmlns:mv="urn:schemas-microsoft-com:mac:vml" xmlns:c="http://schemas.openxmlformats.org/drawingml/2006/chart" xmlns:dgm="http://schemas.openxmlformats.org/drawingml/2006/diagram" xmlns:o="urn:schemas-microsoft-com:office:office" xmlns:v="urn:schemas-microsoft-com:vml" xmlns:pvml="urn:schemas-microsoft-com:office:powerpoint" xmlns:com="http://schemas.openxmlformats.org/drawingml/2006/compatibility" xmlns:p15="http://schemas.microsoft.com/office/powerpoint/2012/main" xmlns:ahyp="http://schemas.microsoft.com/office/drawing/2018/hyperlinkcolor">
       <p:transition spd="slow">
         <p:fade/>
       </p:transition>
@@ -6644,7 +6644,7 @@
         <p:fade/>
       </p:transition>
     </mc:Choice>
-    <mc:Fallback xmlns:ahyp="http://schemas.microsoft.com/office/drawing/2018/hyperlinkcolor" xmlns:p15="http://schemas.microsoft.com/office/powerpoint/2012/main" xmlns:com="http://schemas.openxmlformats.org/drawingml/2006/compatibility" xmlns:pvml="urn:schemas-microsoft-com:office:powerpoint" xmlns:v="urn:schemas-microsoft-com:vml" xmlns:o="urn:schemas-microsoft-com:office:office" xmlns:dgm="http://schemas.openxmlformats.org/drawingml/2006/diagram" xmlns:c="http://schemas.openxmlformats.org/drawingml/2006/chart" xmlns:mv="urn:schemas-microsoft-com:mac:vml" xmlns="">
+    <mc:Fallback xmlns="" xmlns:mv="urn:schemas-microsoft-com:mac:vml" xmlns:c="http://schemas.openxmlformats.org/drawingml/2006/chart" xmlns:dgm="http://schemas.openxmlformats.org/drawingml/2006/diagram" xmlns:o="urn:schemas-microsoft-com:office:office" xmlns:v="urn:schemas-microsoft-com:vml" xmlns:pvml="urn:schemas-microsoft-com:office:powerpoint" xmlns:com="http://schemas.openxmlformats.org/drawingml/2006/compatibility" xmlns:p15="http://schemas.microsoft.com/office/powerpoint/2012/main" xmlns:ahyp="http://schemas.microsoft.com/office/drawing/2018/hyperlinkcolor">
       <p:transition spd="slow">
         <p:fade/>
       </p:transition>
@@ -6681,7 +6681,7 @@
         <p:fade/>
       </p:transition>
     </mc:Choice>
-    <mc:Fallback xmlns:ahyp="http://schemas.microsoft.com/office/drawing/2018/hyperlinkcolor" xmlns:p15="http://schemas.microsoft.com/office/powerpoint/2012/main" xmlns:com="http://schemas.openxmlformats.org/drawingml/2006/compatibility" xmlns:pvml="urn:schemas-microsoft-com:office:powerpoint" xmlns:v="urn:schemas-microsoft-com:vml" xmlns:o="urn:schemas-microsoft-com:office:office" xmlns:dgm="http://schemas.openxmlformats.org/drawingml/2006/diagram" xmlns:c="http://schemas.openxmlformats.org/drawingml/2006/chart" xmlns:mv="urn:schemas-microsoft-com:mac:vml" xmlns="">
+    <mc:Fallback xmlns="" xmlns:mv="urn:schemas-microsoft-com:mac:vml" xmlns:c="http://schemas.openxmlformats.org/drawingml/2006/chart" xmlns:dgm="http://schemas.openxmlformats.org/drawingml/2006/diagram" xmlns:o="urn:schemas-microsoft-com:office:office" xmlns:v="urn:schemas-microsoft-com:vml" xmlns:pvml="urn:schemas-microsoft-com:office:powerpoint" xmlns:com="http://schemas.openxmlformats.org/drawingml/2006/compatibility" xmlns:p15="http://schemas.microsoft.com/office/powerpoint/2012/main" xmlns:ahyp="http://schemas.microsoft.com/office/drawing/2018/hyperlinkcolor">
       <p:transition spd="slow">
         <p:fade/>
       </p:transition>
@@ -6718,7 +6718,7 @@
         <p:fade/>
       </p:transition>
     </mc:Choice>
-    <mc:Fallback xmlns:ahyp="http://schemas.microsoft.com/office/drawing/2018/hyperlinkcolor" xmlns:p15="http://schemas.microsoft.com/office/powerpoint/2012/main" xmlns:com="http://schemas.openxmlformats.org/drawingml/2006/compatibility" xmlns:pvml="urn:schemas-microsoft-com:office:powerpoint" xmlns:v="urn:schemas-microsoft-com:vml" xmlns:o="urn:schemas-microsoft-com:office:office" xmlns:dgm="http://schemas.openxmlformats.org/drawingml/2006/diagram" xmlns:c="http://schemas.openxmlformats.org/drawingml/2006/chart" xmlns:mv="urn:schemas-microsoft-com:mac:vml" xmlns="">
+    <mc:Fallback xmlns="" xmlns:mv="urn:schemas-microsoft-com:mac:vml" xmlns:c="http://schemas.openxmlformats.org/drawingml/2006/chart" xmlns:dgm="http://schemas.openxmlformats.org/drawingml/2006/diagram" xmlns:o="urn:schemas-microsoft-com:office:office" xmlns:v="urn:schemas-microsoft-com:vml" xmlns:pvml="urn:schemas-microsoft-com:office:powerpoint" xmlns:com="http://schemas.openxmlformats.org/drawingml/2006/compatibility" xmlns:p15="http://schemas.microsoft.com/office/powerpoint/2012/main" xmlns:ahyp="http://schemas.microsoft.com/office/drawing/2018/hyperlinkcolor">
       <p:transition spd="slow">
         <p:fade/>
       </p:transition>
@@ -6755,7 +6755,7 @@
         <p:fade/>
       </p:transition>
     </mc:Choice>
-    <mc:Fallback xmlns:ahyp="http://schemas.microsoft.com/office/drawing/2018/hyperlinkcolor" xmlns:p15="http://schemas.microsoft.com/office/powerpoint/2012/main" xmlns:com="http://schemas.openxmlformats.org/drawingml/2006/compatibility" xmlns:pvml="urn:schemas-microsoft-com:office:powerpoint" xmlns:v="urn:schemas-microsoft-com:vml" xmlns:o="urn:schemas-microsoft-com:office:office" xmlns:dgm="http://schemas.openxmlformats.org/drawingml/2006/diagram" xmlns:c="http://schemas.openxmlformats.org/drawingml/2006/chart" xmlns:mv="urn:schemas-microsoft-com:mac:vml" xmlns="">
+    <mc:Fallback xmlns="" xmlns:mv="urn:schemas-microsoft-com:mac:vml" xmlns:c="http://schemas.openxmlformats.org/drawingml/2006/chart" xmlns:dgm="http://schemas.openxmlformats.org/drawingml/2006/diagram" xmlns:o="urn:schemas-microsoft-com:office:office" xmlns:v="urn:schemas-microsoft-com:vml" xmlns:pvml="urn:schemas-microsoft-com:office:powerpoint" xmlns:com="http://schemas.openxmlformats.org/drawingml/2006/compatibility" xmlns:p15="http://schemas.microsoft.com/office/powerpoint/2012/main" xmlns:ahyp="http://schemas.microsoft.com/office/drawing/2018/hyperlinkcolor">
       <p:transition spd="slow">
         <p:fade/>
       </p:transition>
@@ -7354,7 +7354,7 @@
         <p:fade/>
       </p:transition>
     </mc:Choice>
-    <mc:Fallback xmlns:ahyp="http://schemas.microsoft.com/office/drawing/2018/hyperlinkcolor" xmlns:p15="http://schemas.microsoft.com/office/powerpoint/2012/main" xmlns:com="http://schemas.openxmlformats.org/drawingml/2006/compatibility" xmlns:pvml="urn:schemas-microsoft-com:office:powerpoint" xmlns:v="urn:schemas-microsoft-com:vml" xmlns:o="urn:schemas-microsoft-com:office:office" xmlns:dgm="http://schemas.openxmlformats.org/drawingml/2006/diagram" xmlns:c="http://schemas.openxmlformats.org/drawingml/2006/chart" xmlns:mv="urn:schemas-microsoft-com:mac:vml" xmlns="">
+    <mc:Fallback xmlns="" xmlns:mv="urn:schemas-microsoft-com:mac:vml" xmlns:c="http://schemas.openxmlformats.org/drawingml/2006/chart" xmlns:dgm="http://schemas.openxmlformats.org/drawingml/2006/diagram" xmlns:o="urn:schemas-microsoft-com:office:office" xmlns:v="urn:schemas-microsoft-com:vml" xmlns:pvml="urn:schemas-microsoft-com:office:powerpoint" xmlns:com="http://schemas.openxmlformats.org/drawingml/2006/compatibility" xmlns:p15="http://schemas.microsoft.com/office/powerpoint/2012/main" xmlns:ahyp="http://schemas.microsoft.com/office/drawing/2018/hyperlinkcolor">
       <p:transition spd="slow">
         <p:fade/>
       </p:transition>
@@ -11592,42 +11592,6 @@
             <a:endParaRPr dirty="0"/>
           </a:p>
           <a:p>
-            <a:pPr marL="457200" lvl="0" indent="-317500" algn="l" rtl="0">
-              <a:lnSpc>
-                <a:spcPct val="100000"/>
-              </a:lnSpc>
-              <a:spcBef>
-                <a:spcPts val="0"/>
-              </a:spcBef>
-              <a:spcAft>
-                <a:spcPts val="0"/>
-              </a:spcAft>
-              <a:buSzPts val="1400"/>
-              <a:buChar char="●"/>
-            </a:pPr>
-            <a:r>
-              <a:rPr lang="en" dirty="0"/>
-              <a:t>Note: What do you think an outlier might mean for this dataset?</a:t>
-            </a:r>
-            <a:endParaRPr dirty="0"/>
-          </a:p>
-          <a:p>
-            <a:pPr marL="0" lvl="0" indent="0" algn="l" rtl="0">
-              <a:lnSpc>
-                <a:spcPct val="100000"/>
-              </a:lnSpc>
-              <a:spcBef>
-                <a:spcPts val="0"/>
-              </a:spcBef>
-              <a:spcAft>
-                <a:spcPts val="0"/>
-              </a:spcAft>
-              <a:buSzPts val="1400"/>
-              <a:buNone/>
-            </a:pPr>
-            <a:endParaRPr dirty="0"/>
-          </a:p>
-          <a:p>
             <a:pPr marL="0" lvl="0" indent="0" algn="l" rtl="0">
               <a:lnSpc>
                 <a:spcPct val="100000"/>
@@ -11766,7 +11730,7 @@
         </p:blipFill>
         <p:spPr>
           <a:xfrm>
-            <a:off x="4082350" y="4155617"/>
+            <a:off x="3994406" y="3721200"/>
             <a:ext cx="1155188" cy="269825"/>
           </a:xfrm>
           <a:prstGeom prst="rect">

</xml_diff>